<commit_message>
Small changes in the architectural diagrams.
</commit_message>
<xml_diff>
--- a/Architecture/C4Model.pptx
+++ b/Architecture/C4Model.pptx
@@ -106,6 +106,11 @@
       </a:defRPr>
     </a:lvl9pPr>
   </p:defaultTextStyle>
+  <p:extLst>
+    <p:ext uri="{EFAFB233-063F-42B5-8137-9DF3F51BA10A}">
+      <p15:sldGuideLst xmlns:p15="http://schemas.microsoft.com/office/powerpoint/2012/main"/>
+    </p:ext>
+  </p:extLst>
 </p:presentation>
 </file>
 
@@ -256,7 +261,7 @@
           <a:p>
             <a:fld id="{6BE54DF9-4ED2-3449-A742-1881717459CE}" type="datetimeFigureOut">
               <a:rPr lang="en-US" smtClean="0"/>
-              <a:t>4/16/20</a:t>
+              <a:t>4/24/20</a:t>
             </a:fld>
             <a:endParaRPr lang="en-US"/>
           </a:p>
@@ -454,7 +459,7 @@
           <a:p>
             <a:fld id="{6BE54DF9-4ED2-3449-A742-1881717459CE}" type="datetimeFigureOut">
               <a:rPr lang="en-US" smtClean="0"/>
-              <a:t>4/16/20</a:t>
+              <a:t>4/24/20</a:t>
             </a:fld>
             <a:endParaRPr lang="en-US"/>
           </a:p>
@@ -662,7 +667,7 @@
           <a:p>
             <a:fld id="{6BE54DF9-4ED2-3449-A742-1881717459CE}" type="datetimeFigureOut">
               <a:rPr lang="en-US" smtClean="0"/>
-              <a:t>4/16/20</a:t>
+              <a:t>4/24/20</a:t>
             </a:fld>
             <a:endParaRPr lang="en-US"/>
           </a:p>
@@ -860,7 +865,7 @@
           <a:p>
             <a:fld id="{6BE54DF9-4ED2-3449-A742-1881717459CE}" type="datetimeFigureOut">
               <a:rPr lang="en-US" smtClean="0"/>
-              <a:t>4/16/20</a:t>
+              <a:t>4/24/20</a:t>
             </a:fld>
             <a:endParaRPr lang="en-US"/>
           </a:p>
@@ -1135,7 +1140,7 @@
           <a:p>
             <a:fld id="{6BE54DF9-4ED2-3449-A742-1881717459CE}" type="datetimeFigureOut">
               <a:rPr lang="en-US" smtClean="0"/>
-              <a:t>4/16/20</a:t>
+              <a:t>4/24/20</a:t>
             </a:fld>
             <a:endParaRPr lang="en-US"/>
           </a:p>
@@ -1400,7 +1405,7 @@
           <a:p>
             <a:fld id="{6BE54DF9-4ED2-3449-A742-1881717459CE}" type="datetimeFigureOut">
               <a:rPr lang="en-US" smtClean="0"/>
-              <a:t>4/16/20</a:t>
+              <a:t>4/24/20</a:t>
             </a:fld>
             <a:endParaRPr lang="en-US"/>
           </a:p>
@@ -1812,7 +1817,7 @@
           <a:p>
             <a:fld id="{6BE54DF9-4ED2-3449-A742-1881717459CE}" type="datetimeFigureOut">
               <a:rPr lang="en-US" smtClean="0"/>
-              <a:t>4/16/20</a:t>
+              <a:t>4/24/20</a:t>
             </a:fld>
             <a:endParaRPr lang="en-US"/>
           </a:p>
@@ -1953,7 +1958,7 @@
           <a:p>
             <a:fld id="{6BE54DF9-4ED2-3449-A742-1881717459CE}" type="datetimeFigureOut">
               <a:rPr lang="en-US" smtClean="0"/>
-              <a:t>4/16/20</a:t>
+              <a:t>4/24/20</a:t>
             </a:fld>
             <a:endParaRPr lang="en-US"/>
           </a:p>
@@ -2066,7 +2071,7 @@
           <a:p>
             <a:fld id="{6BE54DF9-4ED2-3449-A742-1881717459CE}" type="datetimeFigureOut">
               <a:rPr lang="en-US" smtClean="0"/>
-              <a:t>4/16/20</a:t>
+              <a:t>4/24/20</a:t>
             </a:fld>
             <a:endParaRPr lang="en-US"/>
           </a:p>
@@ -2377,7 +2382,7 @@
           <a:p>
             <a:fld id="{6BE54DF9-4ED2-3449-A742-1881717459CE}" type="datetimeFigureOut">
               <a:rPr lang="en-US" smtClean="0"/>
-              <a:t>4/16/20</a:t>
+              <a:t>4/24/20</a:t>
             </a:fld>
             <a:endParaRPr lang="en-US"/>
           </a:p>
@@ -2665,7 +2670,7 @@
           <a:p>
             <a:fld id="{6BE54DF9-4ED2-3449-A742-1881717459CE}" type="datetimeFigureOut">
               <a:rPr lang="en-US" smtClean="0"/>
-              <a:t>4/16/20</a:t>
+              <a:t>4/24/20</a:t>
             </a:fld>
             <a:endParaRPr lang="en-US"/>
           </a:p>
@@ -2906,7 +2911,7 @@
           <a:p>
             <a:fld id="{6BE54DF9-4ED2-3449-A742-1881717459CE}" type="datetimeFigureOut">
               <a:rPr lang="en-US" smtClean="0"/>
-              <a:t>4/16/20</a:t>
+              <a:t>4/24/20</a:t>
             </a:fld>
             <a:endParaRPr lang="en-US"/>
           </a:p>
@@ -4397,8 +4402,8 @@
         </p:nvSpPr>
         <p:spPr>
           <a:xfrm>
-            <a:off x="972766" y="2016712"/>
-            <a:ext cx="10525328" cy="4406629"/>
+            <a:off x="972766" y="2490808"/>
+            <a:ext cx="10282136" cy="3932533"/>
           </a:xfrm>
           <a:prstGeom prst="rect">
             <a:avLst/>
@@ -4508,9 +4513,9 @@
           <p:nvPr/>
         </p:nvCxnSpPr>
         <p:spPr>
-          <a:xfrm>
-            <a:off x="2346469" y="1475188"/>
-            <a:ext cx="0" cy="540806"/>
+          <a:xfrm flipH="1">
+            <a:off x="2346468" y="1475188"/>
+            <a:ext cx="1" cy="1015620"/>
           </a:xfrm>
           <a:prstGeom prst="straightConnector1">
             <a:avLst/>
@@ -4551,8 +4556,8 @@
         </p:nvCxnSpPr>
         <p:spPr>
           <a:xfrm rot="5400000" flipH="1" flipV="1">
-            <a:off x="9375823" y="1094391"/>
-            <a:ext cx="1021972" cy="833941"/>
+            <a:off x="8813304" y="1408893"/>
+            <a:ext cx="1325063" cy="838768"/>
           </a:xfrm>
           <a:prstGeom prst="bentConnector2">
             <a:avLst/>
@@ -4591,7 +4596,7 @@
         </p:nvSpPr>
         <p:spPr>
           <a:xfrm>
-            <a:off x="2544340" y="1560925"/>
+            <a:off x="2399351" y="1751175"/>
             <a:ext cx="636072" cy="369332"/>
           </a:xfrm>
           <a:prstGeom prst="rect">
@@ -4626,7 +4631,7 @@
         </p:nvSpPr>
         <p:spPr>
           <a:xfrm>
-            <a:off x="8580772" y="360281"/>
+            <a:off x="8186783" y="611263"/>
             <a:ext cx="1580882" cy="369332"/>
           </a:xfrm>
           <a:prstGeom prst="rect">
@@ -4661,7 +4666,7 @@
         </p:nvSpPr>
         <p:spPr>
           <a:xfrm>
-            <a:off x="10303780" y="-15245"/>
+            <a:off x="9895219" y="150125"/>
             <a:ext cx="1782265" cy="2031239"/>
           </a:xfrm>
           <a:prstGeom prst="can">
@@ -4715,8 +4720,8 @@
         </p:nvSpPr>
         <p:spPr>
           <a:xfrm>
-            <a:off x="1470979" y="2471781"/>
-            <a:ext cx="4756826" cy="3422392"/>
+            <a:off x="1470979" y="2839985"/>
+            <a:ext cx="4646918" cy="3054187"/>
           </a:xfrm>
           <a:prstGeom prst="rect">
             <a:avLst/>

</xml_diff>